<commit_message>
Doc update, Fixed WOL inactive icon on Offline agent, Improved some icons view.
</commit_message>
<xml_diff>
--- a/Doc/Remote Client Management.pptx
+++ b/Doc/Remote Client Management.pptx
@@ -4489,7 +4489,7 @@
           <a:p>
             <a:pPr algn="r"/>
             <a:r>
-              <a:rPr lang="he-IL" dirty="0" smtClean="0"/>
+              <a:rPr lang="he-IL" sz="2000" dirty="0" smtClean="0"/>
               <a:t>מאת:</a:t>
             </a:r>
           </a:p>
@@ -4579,6 +4579,36 @@
           </a:extLst>
         </p:spPr>
       </p:pic>
+      <p:sp>
+        <p:nvSpPr>
+          <p:cNvPr id="4" name="TextBox 3"/>
+          <p:cNvSpPr txBox="1"/>
+          <p:nvPr/>
+        </p:nvSpPr>
+        <p:spPr>
+          <a:xfrm>
+            <a:off x="1" y="6493309"/>
+            <a:ext cx="1259632" cy="276999"/>
+          </a:xfrm>
+          <a:prstGeom prst="rect">
+            <a:avLst/>
+          </a:prstGeom>
+          <a:noFill/>
+        </p:spPr>
+        <p:txBody>
+          <a:bodyPr wrap="square" rtlCol="1">
+            <a:spAutoFit/>
+          </a:bodyPr>
+          <a:lstStyle/>
+          <a:p>
+            <a:r>
+              <a:rPr lang="he-IL" sz="1200" dirty="0" smtClean="0"/>
+              <a:t>סמסטר 2011ג'</a:t>
+            </a:r>
+            <a:endParaRPr lang="he-IL" sz="1200" dirty="0"/>
+          </a:p>
+        </p:txBody>
+      </p:sp>
     </p:spTree>
     <p:extLst>
       <p:ext uri="{BB962C8B-B14F-4D97-AF65-F5344CB8AC3E}">
@@ -4726,7 +4756,11 @@
             </a:r>
             <a:r>
               <a:rPr lang="he-IL" dirty="0" smtClean="0"/>
-              <a:t> יוצרים </a:t>
+              <a:t> </a:t>
+            </a:r>
+            <a:r>
+              <a:rPr lang="he-IL" dirty="0" smtClean="0"/>
+              <a:t>יוצרים הרבה </a:t>
             </a:r>
             <a:r>
               <a:rPr lang="en-US" dirty="0" smtClean="0"/>
@@ -4785,6 +4819,18 @@
             <a:r>
               <a:rPr lang="en-US" dirty="0" err="1" smtClean="0"/>
               <a:t>TraceRoute</a:t>
+            </a:r>
+            <a:endParaRPr lang="he-IL" dirty="0" smtClean="0"/>
+          </a:p>
+          <a:p>
+            <a:pPr lvl="1"/>
+            <a:r>
+              <a:rPr lang="he-IL" dirty="0" smtClean="0"/>
+              <a:t>שליחת  </a:t>
+            </a:r>
+            <a:r>
+              <a:rPr lang="en-US" dirty="0" smtClean="0"/>
+              <a:t>Broadcast</a:t>
             </a:r>
             <a:endParaRPr lang="he-IL" dirty="0" smtClean="0"/>
           </a:p>

</xml_diff>